<commit_message>
Update Bindings in presentation
</commit_message>
<xml_diff>
--- a/slides/Durable_Functions.pptx
+++ b/slides/Durable_Functions.pptx
@@ -17882,8 +17882,8 @@
         </p:nvSpPr>
         <p:spPr>
           <a:xfrm>
-            <a:off x="8542620" y="3766784"/>
-            <a:ext cx="2040835" cy="1477328"/>
+            <a:off x="7625371" y="3766784"/>
+            <a:ext cx="4011168" cy="2585323"/>
           </a:xfrm>
           <a:prstGeom prst="rect">
             <a:avLst/>
@@ -17925,7 +17925,7 @@
                   <a:srgbClr val="083232"/>
                 </a:solidFill>
               </a:rPr>
-              <a:t>Blob Storage</a:t>
+              <a:t>Azure Storage (Queue/Blob)</a:t>
             </a:r>
           </a:p>
           <a:p>
@@ -17954,6 +17954,73 @@
               </a:rPr>
               <a:t>SendGrid</a:t>
             </a:r>
+          </a:p>
+          <a:p>
+            <a:pPr algn="ctr"/>
+            <a:r>
+              <a:rPr lang="en-US" dirty="0">
+                <a:solidFill>
+                  <a:srgbClr val="083232"/>
+                </a:solidFill>
+              </a:rPr>
+              <a:t>HTTP</a:t>
+            </a:r>
+          </a:p>
+          <a:p>
+            <a:pPr algn="ctr"/>
+            <a:r>
+              <a:rPr lang="en-US" dirty="0" err="1">
+                <a:solidFill>
+                  <a:srgbClr val="083232"/>
+                </a:solidFill>
+              </a:rPr>
+              <a:t>SignalR</a:t>
+            </a:r>
+            <a:endParaRPr lang="en-US" dirty="0">
+              <a:solidFill>
+                <a:srgbClr val="083232"/>
+              </a:solidFill>
+            </a:endParaRPr>
+          </a:p>
+          <a:p>
+            <a:pPr algn="ctr"/>
+            <a:r>
+              <a:rPr lang="en-US" dirty="0" err="1">
+                <a:solidFill>
+                  <a:srgbClr val="083232"/>
+                </a:solidFill>
+              </a:rPr>
+              <a:t>ServiceBus</a:t>
+            </a:r>
+            <a:endParaRPr lang="en-US" dirty="0">
+              <a:solidFill>
+                <a:srgbClr val="083232"/>
+              </a:solidFill>
+            </a:endParaRPr>
+          </a:p>
+          <a:p>
+            <a:pPr algn="ctr"/>
+            <a:r>
+              <a:rPr lang="en-US" dirty="0">
+                <a:solidFill>
+                  <a:srgbClr val="083232"/>
+                </a:solidFill>
+              </a:rPr>
+              <a:t>… und 12 </a:t>
+            </a:r>
+            <a:r>
+              <a:rPr lang="en-US" dirty="0" err="1">
+                <a:solidFill>
+                  <a:srgbClr val="083232"/>
+                </a:solidFill>
+              </a:rPr>
+              <a:t>weitere</a:t>
+            </a:r>
+            <a:endParaRPr lang="en-US" dirty="0">
+              <a:solidFill>
+                <a:srgbClr val="083232"/>
+              </a:solidFill>
+            </a:endParaRPr>
           </a:p>
         </p:txBody>
       </p:sp>

</xml_diff>